<commit_message>
last minute changes to slide deck and live coding samples
</commit_message>
<xml_diff>
--- a/MamaSaidTestYourCode/cododn2013/Mama Said Test Your Code.pptx
+++ b/MamaSaidTestYourCode/cododn2013/Mama Said Test Your Code.pptx
@@ -9,14 +9,14 @@
   </p:notesMasterIdLst>
   <p:sldIdLst>
     <p:sldId id="256" r:id="rId2"/>
-    <p:sldId id="267" r:id="rId3"/>
-    <p:sldId id="257" r:id="rId4"/>
-    <p:sldId id="260" r:id="rId5"/>
-    <p:sldId id="261" r:id="rId6"/>
-    <p:sldId id="262" r:id="rId7"/>
-    <p:sldId id="263" r:id="rId8"/>
-    <p:sldId id="265" r:id="rId9"/>
-    <p:sldId id="259" r:id="rId10"/>
+    <p:sldId id="257" r:id="rId3"/>
+    <p:sldId id="260" r:id="rId4"/>
+    <p:sldId id="261" r:id="rId5"/>
+    <p:sldId id="262" r:id="rId6"/>
+    <p:sldId id="263" r:id="rId7"/>
+    <p:sldId id="265" r:id="rId8"/>
+    <p:sldId id="259" r:id="rId9"/>
+    <p:sldId id="267" r:id="rId10"/>
     <p:sldId id="264" r:id="rId11"/>
   </p:sldIdLst>
   <p:sldSz cx="9144000" cy="6858000" type="screen4x3"/>
@@ -217,7 +217,7 @@
           <a:p>
             <a:fld id="{58DA5CAF-F516-4106-AD70-5463A03636FA}" type="datetimeFigureOut">
               <a:rPr lang="en-US" smtClean="0"/>
-              <a:t>11/1/2013</a:t>
+              <a:t>11/2/2013</a:t>
             </a:fld>
             <a:endParaRPr lang="en-US"/>
           </a:p>
@@ -634,7 +634,7 @@
           <a:p>
             <a:fld id="{04C25EBD-3D9F-4996-A000-AC6853B634A3}" type="slidenum">
               <a:rPr lang="en-US" smtClean="0"/>
-              <a:t>3</a:t>
+              <a:t>2</a:t>
             </a:fld>
             <a:endParaRPr lang="en-US"/>
           </a:p>
@@ -726,7 +726,7 @@
           <a:p>
             <a:fld id="{04C25EBD-3D9F-4996-A000-AC6853B634A3}" type="slidenum">
               <a:rPr lang="en-US" smtClean="0"/>
-              <a:t>4</a:t>
+              <a:t>3</a:t>
             </a:fld>
             <a:endParaRPr lang="en-US"/>
           </a:p>
@@ -865,7 +865,7 @@
           <a:p>
             <a:fld id="{04C25EBD-3D9F-4996-A000-AC6853B634A3}" type="slidenum">
               <a:rPr lang="en-US" smtClean="0"/>
-              <a:t>5</a:t>
+              <a:t>4</a:t>
             </a:fld>
             <a:endParaRPr lang="en-US"/>
           </a:p>
@@ -946,43 +946,13 @@
             </a:r>
             <a:r>
               <a:rPr lang="en-US" dirty="0" smtClean="0"/>
-              <a:t> 2012</a:t>
-            </a:r>
-          </a:p>
-          <a:p>
+              <a:t> </a:t>
+            </a:r>
+            <a:r>
+              <a:rPr lang="en-US" dirty="0" smtClean="0"/>
+              <a:t>2012</a:t>
+            </a:r>
             <a:endParaRPr lang="en-US" dirty="0" smtClean="0"/>
-          </a:p>
-          <a:p>
-            <a:r>
-              <a:rPr lang="en-US" dirty="0" smtClean="0"/>
-              <a:t>Talk</a:t>
-            </a:r>
-            <a:r>
-              <a:rPr lang="en-US" baseline="0" dirty="0" smtClean="0"/>
-              <a:t> about will be using </a:t>
-            </a:r>
-            <a:r>
-              <a:rPr lang="en-US" baseline="0" dirty="0" err="1" smtClean="0"/>
-              <a:t>QUnitMetro</a:t>
-            </a:r>
-            <a:r>
-              <a:rPr lang="en-US" baseline="0" dirty="0" smtClean="0"/>
-              <a:t> to test </a:t>
-            </a:r>
-            <a:r>
-              <a:rPr lang="en-US" baseline="0" dirty="0" err="1" smtClean="0"/>
-              <a:t>javascript</a:t>
-            </a:r>
-            <a:r>
-              <a:rPr lang="en-US" baseline="0" dirty="0" smtClean="0"/>
-              <a:t> app example</a:t>
-            </a:r>
-          </a:p>
-          <a:p>
-            <a:endParaRPr lang="en-US" baseline="0" dirty="0" smtClean="0"/>
-          </a:p>
-          <a:p>
-            <a:endParaRPr lang="en-US" dirty="0"/>
           </a:p>
         </p:txBody>
       </p:sp>
@@ -1003,7 +973,7 @@
           <a:p>
             <a:fld id="{04C25EBD-3D9F-4996-A000-AC6853B634A3}" type="slidenum">
               <a:rPr lang="en-US" smtClean="0"/>
-              <a:t>6</a:t>
+              <a:t>5</a:t>
             </a:fld>
             <a:endParaRPr lang="en-US"/>
           </a:p>
@@ -1095,7 +1065,7 @@
           <a:p>
             <a:fld id="{04C25EBD-3D9F-4996-A000-AC6853B634A3}" type="slidenum">
               <a:rPr lang="en-US" smtClean="0"/>
-              <a:t>7</a:t>
+              <a:t>6</a:t>
             </a:fld>
             <a:endParaRPr lang="en-US"/>
           </a:p>
@@ -1211,7 +1181,7 @@
           <a:p>
             <a:fld id="{04C25EBD-3D9F-4996-A000-AC6853B634A3}" type="slidenum">
               <a:rPr lang="en-US" smtClean="0"/>
-              <a:t>8</a:t>
+              <a:t>7</a:t>
             </a:fld>
             <a:endParaRPr lang="en-US"/>
           </a:p>
@@ -1295,7 +1265,7 @@
           <a:p>
             <a:fld id="{32B1E7F8-77C5-4D32-B0D8-AF9F13EB2910}" type="slidenum">
               <a:rPr lang="en-US" smtClean="0"/>
-              <a:t>9</a:t>
+              <a:t>8</a:t>
             </a:fld>
             <a:endParaRPr lang="en-US"/>
           </a:p>
@@ -1830,7 +1800,7 @@
           <a:p>
             <a:fld id="{54984510-65F5-4088-AE5A-2DCB978B66F1}" type="datetimeFigureOut">
               <a:rPr lang="en-US" smtClean="0"/>
-              <a:t>11/1/2013</a:t>
+              <a:t>11/2/2013</a:t>
             </a:fld>
             <a:endParaRPr lang="en-US"/>
           </a:p>
@@ -1931,7 +1901,7 @@
           </a:ln>
           <a:extLst>
             <a:ext uri="{91240B29-F687-4f45-9708-019B960494DF}">
-              <a14:hiddenLine xmlns:a14="http://schemas.microsoft.com/office/drawing/2010/main" xmlns="" w="9525">
+              <a14:hiddenLine xmlns="" xmlns:a14="http://schemas.microsoft.com/office/drawing/2010/main" w="9525">
                 <a:solidFill>
                   <a:srgbClr val="000000"/>
                 </a:solidFill>
@@ -1986,7 +1956,7 @@
           </a:ln>
           <a:extLst>
             <a:ext uri="{91240B29-F687-4f45-9708-019B960494DF}">
-              <a14:hiddenLine xmlns:a14="http://schemas.microsoft.com/office/drawing/2010/main" xmlns="" w="9525">
+              <a14:hiddenLine xmlns="" xmlns:a14="http://schemas.microsoft.com/office/drawing/2010/main" w="9525">
                 <a:solidFill>
                   <a:srgbClr val="000000"/>
                 </a:solidFill>
@@ -2241,7 +2211,7 @@
           <a:p>
             <a:fld id="{54984510-65F5-4088-AE5A-2DCB978B66F1}" type="datetimeFigureOut">
               <a:rPr lang="en-US" smtClean="0"/>
-              <a:t>11/1/2013</a:t>
+              <a:t>11/2/2013</a:t>
             </a:fld>
             <a:endParaRPr lang="en-US"/>
           </a:p>
@@ -2489,7 +2459,7 @@
           <a:p>
             <a:fld id="{54984510-65F5-4088-AE5A-2DCB978B66F1}" type="datetimeFigureOut">
               <a:rPr lang="en-US" smtClean="0"/>
-              <a:t>11/1/2013</a:t>
+              <a:t>11/2/2013</a:t>
             </a:fld>
             <a:endParaRPr lang="en-US"/>
           </a:p>
@@ -3029,7 +2999,7 @@
           <a:p>
             <a:fld id="{54984510-65F5-4088-AE5A-2DCB978B66F1}" type="datetimeFigureOut">
               <a:rPr lang="en-US" smtClean="0"/>
-              <a:t>11/1/2013</a:t>
+              <a:t>11/2/2013</a:t>
             </a:fld>
             <a:endParaRPr lang="en-US"/>
           </a:p>
@@ -3277,7 +3247,7 @@
           <a:p>
             <a:fld id="{54984510-65F5-4088-AE5A-2DCB978B66F1}" type="datetimeFigureOut">
               <a:rPr lang="en-US" smtClean="0"/>
-              <a:t>11/1/2013</a:t>
+              <a:t>11/2/2013</a:t>
             </a:fld>
             <a:endParaRPr lang="en-US"/>
           </a:p>
@@ -3809,7 +3779,7 @@
           <a:p>
             <a:fld id="{54984510-65F5-4088-AE5A-2DCB978B66F1}" type="datetimeFigureOut">
               <a:rPr lang="en-US" smtClean="0"/>
-              <a:t>11/1/2013</a:t>
+              <a:t>11/2/2013</a:t>
             </a:fld>
             <a:endParaRPr lang="en-US"/>
           </a:p>
@@ -4106,7 +4076,7 @@
           <a:p>
             <a:fld id="{54984510-65F5-4088-AE5A-2DCB978B66F1}" type="datetimeFigureOut">
               <a:rPr lang="en-US" smtClean="0"/>
-              <a:t>11/1/2013</a:t>
+              <a:t>11/2/2013</a:t>
             </a:fld>
             <a:endParaRPr lang="en-US"/>
           </a:p>
@@ -4280,7 +4250,7 @@
           <a:p>
             <a:fld id="{54984510-65F5-4088-AE5A-2DCB978B66F1}" type="datetimeFigureOut">
               <a:rPr lang="en-US" smtClean="0"/>
-              <a:t>11/1/2013</a:t>
+              <a:t>11/2/2013</a:t>
             </a:fld>
             <a:endParaRPr lang="en-US"/>
           </a:p>
@@ -4460,7 +4430,7 @@
           <a:p>
             <a:fld id="{54984510-65F5-4088-AE5A-2DCB978B66F1}" type="datetimeFigureOut">
               <a:rPr lang="en-US" smtClean="0"/>
-              <a:t>11/1/2013</a:t>
+              <a:t>11/2/2013</a:t>
             </a:fld>
             <a:endParaRPr lang="en-US"/>
           </a:p>
@@ -4645,7 +4615,7 @@
           <a:p>
             <a:fld id="{54984510-65F5-4088-AE5A-2DCB978B66F1}" type="datetimeFigureOut">
               <a:rPr lang="en-US" smtClean="0"/>
-              <a:t>11/1/2013</a:t>
+              <a:t>11/2/2013</a:t>
             </a:fld>
             <a:endParaRPr lang="en-US"/>
           </a:p>
@@ -4901,7 +4871,7 @@
           <a:p>
             <a:fld id="{54984510-65F5-4088-AE5A-2DCB978B66F1}" type="datetimeFigureOut">
               <a:rPr lang="en-US" smtClean="0"/>
-              <a:t>11/1/2013</a:t>
+              <a:t>11/2/2013</a:t>
             </a:fld>
             <a:endParaRPr lang="en-US"/>
           </a:p>
@@ -5203,7 +5173,7 @@
           <a:p>
             <a:fld id="{54984510-65F5-4088-AE5A-2DCB978B66F1}" type="datetimeFigureOut">
               <a:rPr lang="en-US" smtClean="0"/>
-              <a:t>11/1/2013</a:t>
+              <a:t>11/2/2013</a:t>
             </a:fld>
             <a:endParaRPr lang="en-US"/>
           </a:p>
@@ -5645,7 +5615,7 @@
           <a:p>
             <a:fld id="{54984510-65F5-4088-AE5A-2DCB978B66F1}" type="datetimeFigureOut">
               <a:rPr lang="en-US" smtClean="0"/>
-              <a:t>11/1/2013</a:t>
+              <a:t>11/2/2013</a:t>
             </a:fld>
             <a:endParaRPr lang="en-US"/>
           </a:p>
@@ -5763,7 +5733,7 @@
           <a:p>
             <a:fld id="{54984510-65F5-4088-AE5A-2DCB978B66F1}" type="datetimeFigureOut">
               <a:rPr lang="en-US" smtClean="0"/>
-              <a:t>11/1/2013</a:t>
+              <a:t>11/2/2013</a:t>
             </a:fld>
             <a:endParaRPr lang="en-US"/>
           </a:p>
@@ -5858,7 +5828,7 @@
           <a:p>
             <a:fld id="{54984510-65F5-4088-AE5A-2DCB978B66F1}" type="datetimeFigureOut">
               <a:rPr lang="en-US" smtClean="0"/>
-              <a:t>11/1/2013</a:t>
+              <a:t>11/2/2013</a:t>
             </a:fld>
             <a:endParaRPr lang="en-US"/>
           </a:p>
@@ -6141,7 +6111,7 @@
           <a:p>
             <a:fld id="{54984510-65F5-4088-AE5A-2DCB978B66F1}" type="datetimeFigureOut">
               <a:rPr lang="en-US" smtClean="0"/>
-              <a:t>11/1/2013</a:t>
+              <a:t>11/2/2013</a:t>
             </a:fld>
             <a:endParaRPr lang="en-US"/>
           </a:p>
@@ -6432,7 +6402,7 @@
           <a:p>
             <a:fld id="{54984510-65F5-4088-AE5A-2DCB978B66F1}" type="datetimeFigureOut">
               <a:rPr lang="en-US" smtClean="0"/>
-              <a:t>11/1/2013</a:t>
+              <a:t>11/2/2013</a:t>
             </a:fld>
             <a:endParaRPr lang="en-US"/>
           </a:p>
@@ -6956,7 +6926,7 @@
           <a:p>
             <a:fld id="{54984510-65F5-4088-AE5A-2DCB978B66F1}" type="datetimeFigureOut">
               <a:rPr lang="en-US" smtClean="0"/>
-              <a:t>11/1/2013</a:t>
+              <a:t>11/2/2013</a:t>
             </a:fld>
             <a:endParaRPr lang="en-US"/>
           </a:p>
@@ -7540,11 +7510,7 @@
             <a:pPr algn="ctr"/>
             <a:r>
               <a:rPr lang="en-US" dirty="0" smtClean="0"/>
-              <a:t>Jerrel </a:t>
-            </a:r>
-            <a:r>
-              <a:rPr lang="en-US" dirty="0" smtClean="0"/>
-              <a:t>Blankenship</a:t>
+              <a:t>Jerrel Blankenship</a:t>
             </a:r>
           </a:p>
           <a:p>
@@ -7553,7 +7519,6 @@
               <a:rPr lang="en-US" dirty="0" smtClean="0"/>
               <a:t>Central Ohio Day of .NET 2013</a:t>
             </a:r>
-            <a:endParaRPr lang="en-US" dirty="0" smtClean="0"/>
           </a:p>
           <a:p>
             <a:pPr algn="ctr"/>
@@ -7771,6 +7736,768 @@
 </file>
 
 <file path=ppt/slides/slide2.xml><?xml version="1.0" encoding="utf-8"?>
+<p:sld xmlns:a="http://schemas.openxmlformats.org/drawingml/2006/main" xmlns:r="http://schemas.openxmlformats.org/officeDocument/2006/relationships" xmlns:p="http://schemas.openxmlformats.org/presentationml/2006/main">
+  <p:cSld>
+    <p:spTree>
+      <p:nvGrpSpPr>
+        <p:cNvPr id="1" name=""/>
+        <p:cNvGrpSpPr/>
+        <p:nvPr/>
+      </p:nvGrpSpPr>
+      <p:grpSpPr>
+        <a:xfrm>
+          <a:off x="0" y="0"/>
+          <a:ext cx="0" cy="0"/>
+          <a:chOff x="0" y="0"/>
+          <a:chExt cx="0" cy="0"/>
+        </a:xfrm>
+      </p:grpSpPr>
+      <p:sp>
+        <p:nvSpPr>
+          <p:cNvPr id="2" name="Title 1"/>
+          <p:cNvSpPr>
+            <a:spLocks noGrp="1"/>
+          </p:cNvSpPr>
+          <p:nvPr>
+            <p:ph type="title"/>
+          </p:nvPr>
+        </p:nvSpPr>
+        <p:spPr/>
+        <p:txBody>
+          <a:bodyPr/>
+          <a:lstStyle/>
+          <a:p>
+            <a:r>
+              <a:rPr lang="en-US" dirty="0" smtClean="0"/>
+              <a:t>Who Am I?</a:t>
+            </a:r>
+            <a:endParaRPr lang="en-US" dirty="0"/>
+          </a:p>
+        </p:txBody>
+      </p:sp>
+      <p:sp>
+        <p:nvSpPr>
+          <p:cNvPr id="3" name="Content Placeholder 2"/>
+          <p:cNvSpPr>
+            <a:spLocks noGrp="1"/>
+          </p:cNvSpPr>
+          <p:nvPr>
+            <p:ph idx="1"/>
+          </p:nvPr>
+        </p:nvSpPr>
+        <p:spPr/>
+        <p:txBody>
+          <a:bodyPr/>
+          <a:lstStyle/>
+          <a:p>
+            <a:r>
+              <a:rPr lang="en-US" dirty="0" smtClean="0"/>
+              <a:t>Software Engineer at </a:t>
+            </a:r>
+            <a:r>
+              <a:rPr lang="en-US" dirty="0" err="1" smtClean="0"/>
+              <a:t>RelayHealth</a:t>
+            </a:r>
+            <a:endParaRPr lang="en-US" dirty="0" smtClean="0"/>
+          </a:p>
+          <a:p>
+            <a:r>
+              <a:rPr lang="en-US" dirty="0" smtClean="0"/>
+              <a:t>Author: </a:t>
+            </a:r>
+            <a:r>
+              <a:rPr lang="en-US" i="1" dirty="0" smtClean="0"/>
+              <a:t>Pro Agile .NET Development with Scrum</a:t>
+            </a:r>
+          </a:p>
+          <a:p>
+            <a:r>
+              <a:rPr lang="en-US" i="1" dirty="0" smtClean="0"/>
+              <a:t>Striving Software Craftsman</a:t>
+            </a:r>
+          </a:p>
+          <a:p>
+            <a:r>
+              <a:rPr lang="en-US" i="1" dirty="0" smtClean="0"/>
+              <a:t>Certified Scrum Master</a:t>
+            </a:r>
+            <a:endParaRPr lang="en-US" dirty="0" smtClean="0"/>
+          </a:p>
+          <a:p>
+            <a:endParaRPr lang="en-US" dirty="0"/>
+          </a:p>
+        </p:txBody>
+      </p:sp>
+    </p:spTree>
+    <p:extLst>
+      <p:ext uri="{BB962C8B-B14F-4D97-AF65-F5344CB8AC3E}">
+        <p14:creationId xmlns:p14="http://schemas.microsoft.com/office/powerpoint/2010/main" val="1425299187"/>
+      </p:ext>
+    </p:extLst>
+  </p:cSld>
+  <p:clrMapOvr>
+    <a:masterClrMapping/>
+  </p:clrMapOvr>
+  <p:transition spd="slow">
+    <p:push dir="u"/>
+  </p:transition>
+  <p:timing>
+    <p:tnLst>
+      <p:par>
+        <p:cTn id="1" dur="indefinite" restart="never" nodeType="tmRoot"/>
+      </p:par>
+    </p:tnLst>
+  </p:timing>
+</p:sld>
+</file>
+
+<file path=ppt/slides/slide3.xml><?xml version="1.0" encoding="utf-8"?>
+<p:sld xmlns:a="http://schemas.openxmlformats.org/drawingml/2006/main" xmlns:r="http://schemas.openxmlformats.org/officeDocument/2006/relationships" xmlns:p="http://schemas.openxmlformats.org/presentationml/2006/main">
+  <p:cSld>
+    <p:spTree>
+      <p:nvGrpSpPr>
+        <p:cNvPr id="1" name=""/>
+        <p:cNvGrpSpPr/>
+        <p:nvPr/>
+      </p:nvGrpSpPr>
+      <p:grpSpPr>
+        <a:xfrm>
+          <a:off x="0" y="0"/>
+          <a:ext cx="0" cy="0"/>
+          <a:chOff x="0" y="0"/>
+          <a:chExt cx="0" cy="0"/>
+        </a:xfrm>
+      </p:grpSpPr>
+      <p:sp>
+        <p:nvSpPr>
+          <p:cNvPr id="2" name="Title 1"/>
+          <p:cNvSpPr>
+            <a:spLocks noGrp="1"/>
+          </p:cNvSpPr>
+          <p:nvPr>
+            <p:ph type="title"/>
+          </p:nvPr>
+        </p:nvSpPr>
+        <p:spPr/>
+        <p:txBody>
+          <a:bodyPr>
+            <a:normAutofit/>
+          </a:bodyPr>
+          <a:lstStyle/>
+          <a:p>
+            <a:r>
+              <a:rPr lang="en-US" dirty="0" smtClean="0"/>
+              <a:t>Test-Driven Development (TDD)</a:t>
+            </a:r>
+            <a:endParaRPr lang="en-US" dirty="0"/>
+          </a:p>
+        </p:txBody>
+      </p:sp>
+      <p:sp>
+        <p:nvSpPr>
+          <p:cNvPr id="4" name="Content Placeholder 3"/>
+          <p:cNvSpPr>
+            <a:spLocks noGrp="1"/>
+          </p:cNvSpPr>
+          <p:nvPr>
+            <p:ph idx="1"/>
+          </p:nvPr>
+        </p:nvSpPr>
+        <p:spPr/>
+        <p:txBody>
+          <a:bodyPr/>
+          <a:lstStyle/>
+          <a:p>
+            <a:r>
+              <a:rPr lang="en-US" dirty="0" smtClean="0"/>
+              <a:t>Test First Approach to Software Development</a:t>
+            </a:r>
+          </a:p>
+          <a:p>
+            <a:r>
+              <a:rPr lang="en-US" dirty="0" smtClean="0"/>
+              <a:t>Inside-out </a:t>
+            </a:r>
+          </a:p>
+          <a:p>
+            <a:r>
+              <a:rPr lang="en-US" dirty="0" smtClean="0"/>
+              <a:t>Red-Green-Refactor</a:t>
+            </a:r>
+          </a:p>
+          <a:p>
+            <a:r>
+              <a:rPr lang="en-US" dirty="0" smtClean="0"/>
+              <a:t>Write just enough code to get the test to pass and nothing more.</a:t>
+            </a:r>
+            <a:endParaRPr lang="en-US" dirty="0"/>
+          </a:p>
+        </p:txBody>
+      </p:sp>
+    </p:spTree>
+    <p:extLst>
+      <p:ext uri="{BB962C8B-B14F-4D97-AF65-F5344CB8AC3E}">
+        <p14:creationId xmlns:p14="http://schemas.microsoft.com/office/powerpoint/2010/main" val="4099420924"/>
+      </p:ext>
+    </p:extLst>
+  </p:cSld>
+  <p:clrMapOvr>
+    <a:masterClrMapping/>
+  </p:clrMapOvr>
+  <p:transition spd="slow">
+    <p:push dir="u"/>
+  </p:transition>
+  <p:timing>
+    <p:tnLst>
+      <p:par>
+        <p:cTn id="1" dur="indefinite" restart="never" nodeType="tmRoot"/>
+      </p:par>
+    </p:tnLst>
+  </p:timing>
+</p:sld>
+</file>
+
+<file path=ppt/slides/slide4.xml><?xml version="1.0" encoding="utf-8"?>
+<p:sld xmlns:a="http://schemas.openxmlformats.org/drawingml/2006/main" xmlns:r="http://schemas.openxmlformats.org/officeDocument/2006/relationships" xmlns:p="http://schemas.openxmlformats.org/presentationml/2006/main">
+  <p:cSld>
+    <p:spTree>
+      <p:nvGrpSpPr>
+        <p:cNvPr id="1" name=""/>
+        <p:cNvGrpSpPr/>
+        <p:nvPr/>
+      </p:nvGrpSpPr>
+      <p:grpSpPr>
+        <a:xfrm>
+          <a:off x="0" y="0"/>
+          <a:ext cx="0" cy="0"/>
+          <a:chOff x="0" y="0"/>
+          <a:chExt cx="0" cy="0"/>
+        </a:xfrm>
+      </p:grpSpPr>
+      <p:sp>
+        <p:nvSpPr>
+          <p:cNvPr id="2" name="Title 1"/>
+          <p:cNvSpPr>
+            <a:spLocks noGrp="1"/>
+          </p:cNvSpPr>
+          <p:nvPr>
+            <p:ph type="title"/>
+          </p:nvPr>
+        </p:nvSpPr>
+        <p:spPr/>
+        <p:txBody>
+          <a:bodyPr/>
+          <a:lstStyle/>
+          <a:p>
+            <a:r>
+              <a:rPr lang="en-US" dirty="0" smtClean="0"/>
+              <a:t>Its All About The Trust</a:t>
+            </a:r>
+            <a:endParaRPr lang="en-US" dirty="0"/>
+          </a:p>
+        </p:txBody>
+      </p:sp>
+      <p:sp>
+        <p:nvSpPr>
+          <p:cNvPr id="3" name="Content Placeholder 2"/>
+          <p:cNvSpPr>
+            <a:spLocks noGrp="1"/>
+          </p:cNvSpPr>
+          <p:nvPr>
+            <p:ph idx="1"/>
+          </p:nvPr>
+        </p:nvSpPr>
+        <p:spPr/>
+        <p:txBody>
+          <a:bodyPr/>
+          <a:lstStyle/>
+          <a:p>
+            <a:r>
+              <a:rPr lang="en-US" dirty="0" smtClean="0"/>
+              <a:t>Gives you confidence in your code</a:t>
+            </a:r>
+          </a:p>
+          <a:p>
+            <a:pPr lvl="1"/>
+            <a:r>
+              <a:rPr lang="en-US" dirty="0" smtClean="0"/>
+              <a:t>Codebase has a safety net</a:t>
+            </a:r>
+          </a:p>
+          <a:p>
+            <a:r>
+              <a:rPr lang="en-US" dirty="0" smtClean="0"/>
+              <a:t>Gives you improved predictability</a:t>
+            </a:r>
+          </a:p>
+          <a:p>
+            <a:r>
+              <a:rPr lang="en-US" dirty="0" smtClean="0"/>
+              <a:t>Instills confidence in management by constantly delivering what you said you would</a:t>
+            </a:r>
+          </a:p>
+          <a:p>
+            <a:endParaRPr lang="en-US" dirty="0"/>
+          </a:p>
+        </p:txBody>
+      </p:sp>
+    </p:spTree>
+    <p:extLst>
+      <p:ext uri="{BB962C8B-B14F-4D97-AF65-F5344CB8AC3E}">
+        <p14:creationId xmlns:p14="http://schemas.microsoft.com/office/powerpoint/2010/main" val="515809021"/>
+      </p:ext>
+    </p:extLst>
+  </p:cSld>
+  <p:clrMapOvr>
+    <a:masterClrMapping/>
+  </p:clrMapOvr>
+  <p:transition spd="slow">
+    <p:push dir="u"/>
+  </p:transition>
+  <p:timing>
+    <p:tnLst>
+      <p:par>
+        <p:cTn id="1" dur="indefinite" restart="never" nodeType="tmRoot"/>
+      </p:par>
+    </p:tnLst>
+  </p:timing>
+</p:sld>
+</file>
+
+<file path=ppt/slides/slide5.xml><?xml version="1.0" encoding="utf-8"?>
+<p:sld xmlns:a="http://schemas.openxmlformats.org/drawingml/2006/main" xmlns:r="http://schemas.openxmlformats.org/officeDocument/2006/relationships" xmlns:p="http://schemas.openxmlformats.org/presentationml/2006/main">
+  <p:cSld>
+    <p:spTree>
+      <p:nvGrpSpPr>
+        <p:cNvPr id="1" name=""/>
+        <p:cNvGrpSpPr/>
+        <p:nvPr/>
+      </p:nvGrpSpPr>
+      <p:grpSpPr>
+        <a:xfrm>
+          <a:off x="0" y="0"/>
+          <a:ext cx="0" cy="0"/>
+          <a:chOff x="0" y="0"/>
+          <a:chExt cx="0" cy="0"/>
+        </a:xfrm>
+      </p:grpSpPr>
+      <p:sp>
+        <p:nvSpPr>
+          <p:cNvPr id="2" name="Title 1"/>
+          <p:cNvSpPr>
+            <a:spLocks noGrp="1"/>
+          </p:cNvSpPr>
+          <p:nvPr>
+            <p:ph type="title"/>
+          </p:nvPr>
+        </p:nvSpPr>
+        <p:spPr>
+          <a:xfrm>
+            <a:off x="982133" y="838200"/>
+            <a:ext cx="7704667" cy="1981200"/>
+          </a:xfrm>
+        </p:spPr>
+        <p:txBody>
+          <a:bodyPr/>
+          <a:lstStyle/>
+          <a:p>
+            <a:r>
+              <a:rPr lang="en-US" dirty="0" smtClean="0"/>
+              <a:t>Windows Store App Playground</a:t>
+            </a:r>
+            <a:endParaRPr lang="en-US" dirty="0"/>
+          </a:p>
+        </p:txBody>
+      </p:sp>
+      <p:sp>
+        <p:nvSpPr>
+          <p:cNvPr id="3" name="Content Placeholder 2"/>
+          <p:cNvSpPr>
+            <a:spLocks noGrp="1"/>
+          </p:cNvSpPr>
+          <p:nvPr>
+            <p:ph idx="1"/>
+          </p:nvPr>
+        </p:nvSpPr>
+        <p:spPr/>
+        <p:txBody>
+          <a:bodyPr/>
+          <a:lstStyle/>
+          <a:p>
+            <a:r>
+              <a:rPr lang="en-US" dirty="0" smtClean="0"/>
+              <a:t>Two Different Types of Apps</a:t>
+            </a:r>
+          </a:p>
+          <a:p>
+            <a:pPr lvl="1"/>
+            <a:r>
+              <a:rPr lang="en-US" dirty="0" smtClean="0"/>
+              <a:t>XAML Based (VB, C#, C++)</a:t>
+            </a:r>
+          </a:p>
+          <a:p>
+            <a:pPr lvl="1"/>
+            <a:r>
+              <a:rPr lang="en-US" dirty="0" smtClean="0"/>
+              <a:t>JavaScript Based</a:t>
+            </a:r>
+          </a:p>
+          <a:p>
+            <a:pPr lvl="1"/>
+            <a:endParaRPr lang="en-US" dirty="0"/>
+          </a:p>
+        </p:txBody>
+      </p:sp>
+    </p:spTree>
+    <p:extLst>
+      <p:ext uri="{BB962C8B-B14F-4D97-AF65-F5344CB8AC3E}">
+        <p14:creationId xmlns:p14="http://schemas.microsoft.com/office/powerpoint/2010/main" val="2631834315"/>
+      </p:ext>
+    </p:extLst>
+  </p:cSld>
+  <p:clrMapOvr>
+    <a:masterClrMapping/>
+  </p:clrMapOvr>
+  <p:transition spd="slow">
+    <p:push dir="u"/>
+  </p:transition>
+  <p:timing>
+    <p:tnLst>
+      <p:par>
+        <p:cTn id="1" dur="indefinite" restart="never" nodeType="tmRoot"/>
+      </p:par>
+    </p:tnLst>
+  </p:timing>
+</p:sld>
+</file>
+
+<file path=ppt/slides/slide6.xml><?xml version="1.0" encoding="utf-8"?>
+<p:sld xmlns:a="http://schemas.openxmlformats.org/drawingml/2006/main" xmlns:r="http://schemas.openxmlformats.org/officeDocument/2006/relationships" xmlns:p="http://schemas.openxmlformats.org/presentationml/2006/main">
+  <p:cSld>
+    <p:spTree>
+      <p:nvGrpSpPr>
+        <p:cNvPr id="1" name=""/>
+        <p:cNvGrpSpPr/>
+        <p:nvPr/>
+      </p:nvGrpSpPr>
+      <p:grpSpPr>
+        <a:xfrm>
+          <a:off x="0" y="0"/>
+          <a:ext cx="0" cy="0"/>
+          <a:chOff x="0" y="0"/>
+          <a:chExt cx="0" cy="0"/>
+        </a:xfrm>
+      </p:grpSpPr>
+      <p:sp>
+        <p:nvSpPr>
+          <p:cNvPr id="6" name="Title 5"/>
+          <p:cNvSpPr>
+            <a:spLocks noGrp="1"/>
+          </p:cNvSpPr>
+          <p:nvPr>
+            <p:ph type="ctrTitle"/>
+          </p:nvPr>
+        </p:nvSpPr>
+        <p:spPr/>
+        <p:txBody>
+          <a:bodyPr/>
+          <a:lstStyle/>
+          <a:p>
+            <a:r>
+              <a:rPr lang="en-US" dirty="0" smtClean="0"/>
+              <a:t>Let’s Go to the Code!</a:t>
+            </a:r>
+            <a:endParaRPr lang="en-US" dirty="0"/>
+          </a:p>
+        </p:txBody>
+      </p:sp>
+      <p:sp>
+        <p:nvSpPr>
+          <p:cNvPr id="7" name="Subtitle 6"/>
+          <p:cNvSpPr>
+            <a:spLocks noGrp="1"/>
+          </p:cNvSpPr>
+          <p:nvPr>
+            <p:ph type="subTitle" idx="1"/>
+          </p:nvPr>
+        </p:nvSpPr>
+        <p:spPr/>
+        <p:txBody>
+          <a:bodyPr/>
+          <a:lstStyle/>
+          <a:p>
+            <a:endParaRPr lang="en-US"/>
+          </a:p>
+        </p:txBody>
+      </p:sp>
+    </p:spTree>
+    <p:extLst>
+      <p:ext uri="{BB962C8B-B14F-4D97-AF65-F5344CB8AC3E}">
+        <p14:creationId xmlns:p14="http://schemas.microsoft.com/office/powerpoint/2010/main" val="4112694553"/>
+      </p:ext>
+    </p:extLst>
+  </p:cSld>
+  <p:clrMapOvr>
+    <a:masterClrMapping/>
+  </p:clrMapOvr>
+  <p:transition spd="slow">
+    <p:push dir="u"/>
+  </p:transition>
+  <p:timing>
+    <p:tnLst>
+      <p:par>
+        <p:cTn id="1" dur="indefinite" restart="never" nodeType="tmRoot"/>
+      </p:par>
+    </p:tnLst>
+  </p:timing>
+</p:sld>
+</file>
+
+<file path=ppt/slides/slide7.xml><?xml version="1.0" encoding="utf-8"?>
+<p:sld xmlns:a="http://schemas.openxmlformats.org/drawingml/2006/main" xmlns:r="http://schemas.openxmlformats.org/officeDocument/2006/relationships" xmlns:p="http://schemas.openxmlformats.org/presentationml/2006/main">
+  <p:cSld>
+    <p:spTree>
+      <p:nvGrpSpPr>
+        <p:cNvPr id="1" name=""/>
+        <p:cNvGrpSpPr/>
+        <p:nvPr/>
+      </p:nvGrpSpPr>
+      <p:grpSpPr>
+        <a:xfrm>
+          <a:off x="0" y="0"/>
+          <a:ext cx="0" cy="0"/>
+          <a:chOff x="0" y="0"/>
+          <a:chExt cx="0" cy="0"/>
+        </a:xfrm>
+      </p:grpSpPr>
+      <p:sp>
+        <p:nvSpPr>
+          <p:cNvPr id="2" name="Title 1"/>
+          <p:cNvSpPr>
+            <a:spLocks noGrp="1"/>
+          </p:cNvSpPr>
+          <p:nvPr>
+            <p:ph type="title"/>
+          </p:nvPr>
+        </p:nvSpPr>
+        <p:spPr/>
+        <p:txBody>
+          <a:bodyPr/>
+          <a:lstStyle/>
+          <a:p>
+            <a:r>
+              <a:rPr lang="en-US" dirty="0" smtClean="0"/>
+              <a:t>The Downsides</a:t>
+            </a:r>
+            <a:endParaRPr lang="en-US" dirty="0"/>
+          </a:p>
+        </p:txBody>
+      </p:sp>
+      <p:sp>
+        <p:nvSpPr>
+          <p:cNvPr id="3" name="Content Placeholder 2"/>
+          <p:cNvSpPr>
+            <a:spLocks noGrp="1"/>
+          </p:cNvSpPr>
+          <p:nvPr>
+            <p:ph idx="1"/>
+          </p:nvPr>
+        </p:nvSpPr>
+        <p:spPr/>
+        <p:txBody>
+          <a:bodyPr/>
+          <a:lstStyle/>
+          <a:p>
+            <a:r>
+              <a:rPr lang="en-US" dirty="0" smtClean="0"/>
+              <a:t>Cannot create UI Tests for JavaScript based Apps</a:t>
+            </a:r>
+          </a:p>
+          <a:p>
+            <a:r>
+              <a:rPr lang="en-US" dirty="0" smtClean="0"/>
+              <a:t>Cannot use mocking frameworks like MOQ</a:t>
+            </a:r>
+          </a:p>
+          <a:p>
+            <a:pPr lvl="1"/>
+            <a:r>
+              <a:rPr lang="en-US" dirty="0" smtClean="0"/>
+              <a:t>Can use Microsoft’s own Fakes framework</a:t>
+            </a:r>
+          </a:p>
+          <a:p>
+            <a:r>
+              <a:rPr lang="en-US" dirty="0" err="1" smtClean="0"/>
+              <a:t>XUnit</a:t>
+            </a:r>
+            <a:r>
+              <a:rPr lang="en-US" dirty="0" smtClean="0"/>
+              <a:t> </a:t>
+            </a:r>
+            <a:r>
+              <a:rPr lang="en-US" dirty="0" smtClean="0"/>
+              <a:t>is supported through third-party project template available for down load</a:t>
+            </a:r>
+          </a:p>
+          <a:p>
+            <a:endParaRPr lang="en-US" dirty="0"/>
+          </a:p>
+        </p:txBody>
+      </p:sp>
+    </p:spTree>
+    <p:extLst>
+      <p:ext uri="{BB962C8B-B14F-4D97-AF65-F5344CB8AC3E}">
+        <p14:creationId xmlns:p14="http://schemas.microsoft.com/office/powerpoint/2010/main" val="3953608039"/>
+      </p:ext>
+    </p:extLst>
+  </p:cSld>
+  <p:clrMapOvr>
+    <a:masterClrMapping/>
+  </p:clrMapOvr>
+  <p:timing>
+    <p:tnLst>
+      <p:par>
+        <p:cTn id="1" dur="indefinite" restart="never" nodeType="tmRoot"/>
+      </p:par>
+    </p:tnLst>
+  </p:timing>
+</p:sld>
+</file>
+
+<file path=ppt/slides/slide8.xml><?xml version="1.0" encoding="utf-8"?>
+<p:sld xmlns:a="http://schemas.openxmlformats.org/drawingml/2006/main" xmlns:r="http://schemas.openxmlformats.org/officeDocument/2006/relationships" xmlns:p="http://schemas.openxmlformats.org/presentationml/2006/main">
+  <p:cSld>
+    <p:spTree>
+      <p:nvGrpSpPr>
+        <p:cNvPr id="1" name=""/>
+        <p:cNvGrpSpPr/>
+        <p:nvPr/>
+      </p:nvGrpSpPr>
+      <p:grpSpPr>
+        <a:xfrm>
+          <a:off x="0" y="0"/>
+          <a:ext cx="0" cy="0"/>
+          <a:chOff x="0" y="0"/>
+          <a:chExt cx="0" cy="0"/>
+        </a:xfrm>
+      </p:grpSpPr>
+      <p:sp>
+        <p:nvSpPr>
+          <p:cNvPr id="2" name="Title 1"/>
+          <p:cNvSpPr>
+            <a:spLocks noGrp="1"/>
+          </p:cNvSpPr>
+          <p:nvPr>
+            <p:ph type="title"/>
+          </p:nvPr>
+        </p:nvSpPr>
+        <p:spPr>
+          <a:xfrm>
+            <a:off x="982133" y="457201"/>
+            <a:ext cx="7704667" cy="1130826"/>
+          </a:xfrm>
+        </p:spPr>
+        <p:txBody>
+          <a:bodyPr>
+            <a:noAutofit/>
+          </a:bodyPr>
+          <a:lstStyle/>
+          <a:p>
+            <a:r>
+              <a:rPr lang="en-US" sz="3600" dirty="0" smtClean="0"/>
+              <a:t>Pro Agile .NET Development with Scrum</a:t>
+            </a:r>
+            <a:endParaRPr lang="en-US" sz="3600" dirty="0"/>
+          </a:p>
+        </p:txBody>
+      </p:sp>
+      <p:pic>
+        <p:nvPicPr>
+          <p:cNvPr id="4" name="Content Placeholder 3" descr="Screen Shot 2011-10-22 at 9.08.29 AM.png"/>
+          <p:cNvPicPr>
+            <a:picLocks noGrp="1" noChangeAspect="1"/>
+          </p:cNvPicPr>
+          <p:nvPr>
+            <p:ph idx="1"/>
+          </p:nvPr>
+        </p:nvPicPr>
+        <p:blipFill>
+          <a:blip r:embed="rId3">
+            <a:extLst>
+              <a:ext uri="{28A0092B-C50C-407E-A947-70E740481C1C}">
+                <a14:useLocalDpi xmlns:a14="http://schemas.microsoft.com/office/drawing/2010/main" val="0"/>
+              </a:ext>
+            </a:extLst>
+          </a:blip>
+          <a:srcRect l="-88527" r="-88527"/>
+          <a:stretch>
+            <a:fillRect/>
+          </a:stretch>
+        </p:blipFill>
+        <p:spPr>
+          <a:xfrm>
+            <a:off x="-304800" y="1676400"/>
+            <a:ext cx="9677400" cy="4343400"/>
+          </a:xfrm>
+        </p:spPr>
+      </p:pic>
+      <p:sp>
+        <p:nvSpPr>
+          <p:cNvPr id="3" name="Footer Placeholder 2"/>
+          <p:cNvSpPr>
+            <a:spLocks noGrp="1"/>
+          </p:cNvSpPr>
+          <p:nvPr>
+            <p:ph type="ftr" sz="quarter" idx="11"/>
+          </p:nvPr>
+        </p:nvSpPr>
+        <p:spPr>
+          <a:xfrm>
+            <a:off x="3200400" y="6108173"/>
+            <a:ext cx="2971800" cy="365125"/>
+          </a:xfrm>
+        </p:spPr>
+        <p:txBody>
+          <a:bodyPr/>
+          <a:lstStyle/>
+          <a:p>
+            <a:r>
+              <a:rPr lang="en-US" sz="2000" dirty="0">
+                <a:solidFill>
+                  <a:srgbClr val="0070C0"/>
+                </a:solidFill>
+              </a:rPr>
+              <a:t>http://amzn.to/1aMYF24</a:t>
+            </a:r>
+          </a:p>
+        </p:txBody>
+      </p:sp>
+    </p:spTree>
+    <p:extLst>
+      <p:ext uri="{BB962C8B-B14F-4D97-AF65-F5344CB8AC3E}">
+        <p14:creationId xmlns:p14="http://schemas.microsoft.com/office/powerpoint/2010/main" val="2348140690"/>
+      </p:ext>
+    </p:extLst>
+  </p:cSld>
+  <p:clrMapOvr>
+    <a:masterClrMapping/>
+  </p:clrMapOvr>
+  <p:transition spd="slow">
+    <p:push dir="u"/>
+  </p:transition>
+  <p:timing>
+    <p:tnLst>
+      <p:par>
+        <p:cTn id="1" dur="indefinite" restart="never" nodeType="tmRoot"/>
+      </p:par>
+    </p:tnLst>
+  </p:timing>
+</p:sld>
+</file>
+
+<file path=ppt/slides/slide9.xml><?xml version="1.0" encoding="utf-8"?>
 <p:sld xmlns:a="http://schemas.openxmlformats.org/drawingml/2006/main" xmlns:r="http://schemas.openxmlformats.org/officeDocument/2006/relationships" xmlns:p="http://schemas.openxmlformats.org/presentationml/2006/main" showMasterSp="0">
   <p:cSld>
     <p:bg>
@@ -8401,779 +9128,6 @@
     <p:extLst>
       <p:ext uri="{BB962C8B-B14F-4D97-AF65-F5344CB8AC3E}">
         <p14:creationId xmlns:p14="http://schemas.microsoft.com/office/powerpoint/2010/main" val="3992859686"/>
-      </p:ext>
-    </p:extLst>
-  </p:cSld>
-  <p:clrMapOvr>
-    <a:masterClrMapping/>
-  </p:clrMapOvr>
-</p:sld>
-</file>
-
-<file path=ppt/slides/slide3.xml><?xml version="1.0" encoding="utf-8"?>
-<p:sld xmlns:a="http://schemas.openxmlformats.org/drawingml/2006/main" xmlns:r="http://schemas.openxmlformats.org/officeDocument/2006/relationships" xmlns:p="http://schemas.openxmlformats.org/presentationml/2006/main">
-  <p:cSld>
-    <p:spTree>
-      <p:nvGrpSpPr>
-        <p:cNvPr id="1" name=""/>
-        <p:cNvGrpSpPr/>
-        <p:nvPr/>
-      </p:nvGrpSpPr>
-      <p:grpSpPr>
-        <a:xfrm>
-          <a:off x="0" y="0"/>
-          <a:ext cx="0" cy="0"/>
-          <a:chOff x="0" y="0"/>
-          <a:chExt cx="0" cy="0"/>
-        </a:xfrm>
-      </p:grpSpPr>
-      <p:sp>
-        <p:nvSpPr>
-          <p:cNvPr id="2" name="Title 1"/>
-          <p:cNvSpPr>
-            <a:spLocks noGrp="1"/>
-          </p:cNvSpPr>
-          <p:nvPr>
-            <p:ph type="title"/>
-          </p:nvPr>
-        </p:nvSpPr>
-        <p:spPr/>
-        <p:txBody>
-          <a:bodyPr/>
-          <a:lstStyle/>
-          <a:p>
-            <a:r>
-              <a:rPr lang="en-US" dirty="0" smtClean="0"/>
-              <a:t>Who Am I?</a:t>
-            </a:r>
-            <a:endParaRPr lang="en-US" dirty="0"/>
-          </a:p>
-        </p:txBody>
-      </p:sp>
-      <p:sp>
-        <p:nvSpPr>
-          <p:cNvPr id="3" name="Content Placeholder 2"/>
-          <p:cNvSpPr>
-            <a:spLocks noGrp="1"/>
-          </p:cNvSpPr>
-          <p:nvPr>
-            <p:ph idx="1"/>
-          </p:nvPr>
-        </p:nvSpPr>
-        <p:spPr/>
-        <p:txBody>
-          <a:bodyPr/>
-          <a:lstStyle/>
-          <a:p>
-            <a:r>
-              <a:rPr lang="en-US" dirty="0" smtClean="0"/>
-              <a:t>Software Engineer at </a:t>
-            </a:r>
-            <a:r>
-              <a:rPr lang="en-US" dirty="0" err="1" smtClean="0"/>
-              <a:t>RelayHealth</a:t>
-            </a:r>
-            <a:endParaRPr lang="en-US" dirty="0" smtClean="0"/>
-          </a:p>
-          <a:p>
-            <a:r>
-              <a:rPr lang="en-US" dirty="0" smtClean="0"/>
-              <a:t>Author: </a:t>
-            </a:r>
-            <a:r>
-              <a:rPr lang="en-US" i="1" dirty="0" smtClean="0"/>
-              <a:t>Pro Agile .NET Development with Scrum</a:t>
-            </a:r>
-          </a:p>
-          <a:p>
-            <a:r>
-              <a:rPr lang="en-US" i="1" dirty="0" smtClean="0"/>
-              <a:t>Striving Software Craftsman</a:t>
-            </a:r>
-          </a:p>
-          <a:p>
-            <a:r>
-              <a:rPr lang="en-US" i="1" dirty="0" smtClean="0"/>
-              <a:t>Certified Scrum Master</a:t>
-            </a:r>
-            <a:endParaRPr lang="en-US" dirty="0" smtClean="0"/>
-          </a:p>
-          <a:p>
-            <a:endParaRPr lang="en-US" dirty="0"/>
-          </a:p>
-        </p:txBody>
-      </p:sp>
-    </p:spTree>
-    <p:extLst>
-      <p:ext uri="{BB962C8B-B14F-4D97-AF65-F5344CB8AC3E}">
-        <p14:creationId xmlns:p14="http://schemas.microsoft.com/office/powerpoint/2010/main" val="1425299187"/>
-      </p:ext>
-    </p:extLst>
-  </p:cSld>
-  <p:clrMapOvr>
-    <a:masterClrMapping/>
-  </p:clrMapOvr>
-  <p:transition spd="slow">
-    <p:push dir="u"/>
-  </p:transition>
-  <p:timing>
-    <p:tnLst>
-      <p:par>
-        <p:cTn id="1" dur="indefinite" restart="never" nodeType="tmRoot"/>
-      </p:par>
-    </p:tnLst>
-  </p:timing>
-</p:sld>
-</file>
-
-<file path=ppt/slides/slide4.xml><?xml version="1.0" encoding="utf-8"?>
-<p:sld xmlns:a="http://schemas.openxmlformats.org/drawingml/2006/main" xmlns:r="http://schemas.openxmlformats.org/officeDocument/2006/relationships" xmlns:p="http://schemas.openxmlformats.org/presentationml/2006/main">
-  <p:cSld>
-    <p:spTree>
-      <p:nvGrpSpPr>
-        <p:cNvPr id="1" name=""/>
-        <p:cNvGrpSpPr/>
-        <p:nvPr/>
-      </p:nvGrpSpPr>
-      <p:grpSpPr>
-        <a:xfrm>
-          <a:off x="0" y="0"/>
-          <a:ext cx="0" cy="0"/>
-          <a:chOff x="0" y="0"/>
-          <a:chExt cx="0" cy="0"/>
-        </a:xfrm>
-      </p:grpSpPr>
-      <p:sp>
-        <p:nvSpPr>
-          <p:cNvPr id="2" name="Title 1"/>
-          <p:cNvSpPr>
-            <a:spLocks noGrp="1"/>
-          </p:cNvSpPr>
-          <p:nvPr>
-            <p:ph type="title"/>
-          </p:nvPr>
-        </p:nvSpPr>
-        <p:spPr/>
-        <p:txBody>
-          <a:bodyPr>
-            <a:normAutofit/>
-          </a:bodyPr>
-          <a:lstStyle/>
-          <a:p>
-            <a:r>
-              <a:rPr lang="en-US" dirty="0" smtClean="0"/>
-              <a:t>Test-Driven Development (TDD)</a:t>
-            </a:r>
-            <a:endParaRPr lang="en-US" dirty="0"/>
-          </a:p>
-        </p:txBody>
-      </p:sp>
-      <p:sp>
-        <p:nvSpPr>
-          <p:cNvPr id="4" name="Content Placeholder 3"/>
-          <p:cNvSpPr>
-            <a:spLocks noGrp="1"/>
-          </p:cNvSpPr>
-          <p:nvPr>
-            <p:ph idx="1"/>
-          </p:nvPr>
-        </p:nvSpPr>
-        <p:spPr/>
-        <p:txBody>
-          <a:bodyPr/>
-          <a:lstStyle/>
-          <a:p>
-            <a:r>
-              <a:rPr lang="en-US" dirty="0" smtClean="0"/>
-              <a:t>Test First Approach to Software Development</a:t>
-            </a:r>
-          </a:p>
-          <a:p>
-            <a:r>
-              <a:rPr lang="en-US" dirty="0" smtClean="0"/>
-              <a:t>Inside-out </a:t>
-            </a:r>
-          </a:p>
-          <a:p>
-            <a:r>
-              <a:rPr lang="en-US" dirty="0" smtClean="0"/>
-              <a:t>Red-Green-Refactor</a:t>
-            </a:r>
-          </a:p>
-          <a:p>
-            <a:r>
-              <a:rPr lang="en-US" dirty="0" smtClean="0"/>
-              <a:t>Write just enough code to get the test to pass and nothing more.</a:t>
-            </a:r>
-            <a:endParaRPr lang="en-US" dirty="0"/>
-          </a:p>
-        </p:txBody>
-      </p:sp>
-    </p:spTree>
-    <p:extLst>
-      <p:ext uri="{BB962C8B-B14F-4D97-AF65-F5344CB8AC3E}">
-        <p14:creationId xmlns:p14="http://schemas.microsoft.com/office/powerpoint/2010/main" val="4099420924"/>
-      </p:ext>
-    </p:extLst>
-  </p:cSld>
-  <p:clrMapOvr>
-    <a:masterClrMapping/>
-  </p:clrMapOvr>
-  <p:transition spd="slow">
-    <p:push dir="u"/>
-  </p:transition>
-  <p:timing>
-    <p:tnLst>
-      <p:par>
-        <p:cTn id="1" dur="indefinite" restart="never" nodeType="tmRoot"/>
-      </p:par>
-    </p:tnLst>
-  </p:timing>
-</p:sld>
-</file>
-
-<file path=ppt/slides/slide5.xml><?xml version="1.0" encoding="utf-8"?>
-<p:sld xmlns:a="http://schemas.openxmlformats.org/drawingml/2006/main" xmlns:r="http://schemas.openxmlformats.org/officeDocument/2006/relationships" xmlns:p="http://schemas.openxmlformats.org/presentationml/2006/main">
-  <p:cSld>
-    <p:spTree>
-      <p:nvGrpSpPr>
-        <p:cNvPr id="1" name=""/>
-        <p:cNvGrpSpPr/>
-        <p:nvPr/>
-      </p:nvGrpSpPr>
-      <p:grpSpPr>
-        <a:xfrm>
-          <a:off x="0" y="0"/>
-          <a:ext cx="0" cy="0"/>
-          <a:chOff x="0" y="0"/>
-          <a:chExt cx="0" cy="0"/>
-        </a:xfrm>
-      </p:grpSpPr>
-      <p:sp>
-        <p:nvSpPr>
-          <p:cNvPr id="2" name="Title 1"/>
-          <p:cNvSpPr>
-            <a:spLocks noGrp="1"/>
-          </p:cNvSpPr>
-          <p:nvPr>
-            <p:ph type="title"/>
-          </p:nvPr>
-        </p:nvSpPr>
-        <p:spPr/>
-        <p:txBody>
-          <a:bodyPr/>
-          <a:lstStyle/>
-          <a:p>
-            <a:r>
-              <a:rPr lang="en-US" dirty="0" smtClean="0"/>
-              <a:t>Its All About The Trust</a:t>
-            </a:r>
-            <a:endParaRPr lang="en-US" dirty="0"/>
-          </a:p>
-        </p:txBody>
-      </p:sp>
-      <p:sp>
-        <p:nvSpPr>
-          <p:cNvPr id="3" name="Content Placeholder 2"/>
-          <p:cNvSpPr>
-            <a:spLocks noGrp="1"/>
-          </p:cNvSpPr>
-          <p:nvPr>
-            <p:ph idx="1"/>
-          </p:nvPr>
-        </p:nvSpPr>
-        <p:spPr/>
-        <p:txBody>
-          <a:bodyPr/>
-          <a:lstStyle/>
-          <a:p>
-            <a:r>
-              <a:rPr lang="en-US" dirty="0" smtClean="0"/>
-              <a:t>Gives you confidence in your code</a:t>
-            </a:r>
-          </a:p>
-          <a:p>
-            <a:pPr lvl="1"/>
-            <a:r>
-              <a:rPr lang="en-US" dirty="0" smtClean="0"/>
-              <a:t>Codebase has a safety net</a:t>
-            </a:r>
-          </a:p>
-          <a:p>
-            <a:r>
-              <a:rPr lang="en-US" dirty="0" smtClean="0"/>
-              <a:t>Gives you improved predictability</a:t>
-            </a:r>
-          </a:p>
-          <a:p>
-            <a:r>
-              <a:rPr lang="en-US" dirty="0" smtClean="0"/>
-              <a:t>Instills confidence in management by constantly delivering what you said you would</a:t>
-            </a:r>
-          </a:p>
-          <a:p>
-            <a:endParaRPr lang="en-US" dirty="0"/>
-          </a:p>
-        </p:txBody>
-      </p:sp>
-    </p:spTree>
-    <p:extLst>
-      <p:ext uri="{BB962C8B-B14F-4D97-AF65-F5344CB8AC3E}">
-        <p14:creationId xmlns:p14="http://schemas.microsoft.com/office/powerpoint/2010/main" val="515809021"/>
-      </p:ext>
-    </p:extLst>
-  </p:cSld>
-  <p:clrMapOvr>
-    <a:masterClrMapping/>
-  </p:clrMapOvr>
-  <p:transition spd="slow">
-    <p:push dir="u"/>
-  </p:transition>
-  <p:timing>
-    <p:tnLst>
-      <p:par>
-        <p:cTn id="1" dur="indefinite" restart="never" nodeType="tmRoot"/>
-      </p:par>
-    </p:tnLst>
-  </p:timing>
-</p:sld>
-</file>
-
-<file path=ppt/slides/slide6.xml><?xml version="1.0" encoding="utf-8"?>
-<p:sld xmlns:a="http://schemas.openxmlformats.org/drawingml/2006/main" xmlns:r="http://schemas.openxmlformats.org/officeDocument/2006/relationships" xmlns:p="http://schemas.openxmlformats.org/presentationml/2006/main">
-  <p:cSld>
-    <p:spTree>
-      <p:nvGrpSpPr>
-        <p:cNvPr id="1" name=""/>
-        <p:cNvGrpSpPr/>
-        <p:nvPr/>
-      </p:nvGrpSpPr>
-      <p:grpSpPr>
-        <a:xfrm>
-          <a:off x="0" y="0"/>
-          <a:ext cx="0" cy="0"/>
-          <a:chOff x="0" y="0"/>
-          <a:chExt cx="0" cy="0"/>
-        </a:xfrm>
-      </p:grpSpPr>
-      <p:sp>
-        <p:nvSpPr>
-          <p:cNvPr id="2" name="Title 1"/>
-          <p:cNvSpPr>
-            <a:spLocks noGrp="1"/>
-          </p:cNvSpPr>
-          <p:nvPr>
-            <p:ph type="title"/>
-          </p:nvPr>
-        </p:nvSpPr>
-        <p:spPr>
-          <a:xfrm>
-            <a:off x="982133" y="838200"/>
-            <a:ext cx="7704667" cy="1981200"/>
-          </a:xfrm>
-        </p:spPr>
-        <p:txBody>
-          <a:bodyPr/>
-          <a:lstStyle/>
-          <a:p>
-            <a:r>
-              <a:rPr lang="en-US" dirty="0" smtClean="0"/>
-              <a:t>Windows Store App Playground</a:t>
-            </a:r>
-            <a:endParaRPr lang="en-US" dirty="0"/>
-          </a:p>
-        </p:txBody>
-      </p:sp>
-      <p:sp>
-        <p:nvSpPr>
-          <p:cNvPr id="3" name="Content Placeholder 2"/>
-          <p:cNvSpPr>
-            <a:spLocks noGrp="1"/>
-          </p:cNvSpPr>
-          <p:nvPr>
-            <p:ph idx="1"/>
-          </p:nvPr>
-        </p:nvSpPr>
-        <p:spPr/>
-        <p:txBody>
-          <a:bodyPr/>
-          <a:lstStyle/>
-          <a:p>
-            <a:r>
-              <a:rPr lang="en-US" dirty="0" smtClean="0"/>
-              <a:t>Two Different Types of Apps</a:t>
-            </a:r>
-          </a:p>
-          <a:p>
-            <a:pPr lvl="1"/>
-            <a:r>
-              <a:rPr lang="en-US" dirty="0" smtClean="0"/>
-              <a:t>XAML Based (VB, C#, C++)</a:t>
-            </a:r>
-          </a:p>
-          <a:p>
-            <a:pPr lvl="1"/>
-            <a:r>
-              <a:rPr lang="en-US" dirty="0" smtClean="0"/>
-              <a:t>JavaScript Based</a:t>
-            </a:r>
-          </a:p>
-          <a:p>
-            <a:pPr lvl="1"/>
-            <a:endParaRPr lang="en-US" dirty="0"/>
-          </a:p>
-        </p:txBody>
-      </p:sp>
-    </p:spTree>
-    <p:extLst>
-      <p:ext uri="{BB962C8B-B14F-4D97-AF65-F5344CB8AC3E}">
-        <p14:creationId xmlns:p14="http://schemas.microsoft.com/office/powerpoint/2010/main" val="2631834315"/>
-      </p:ext>
-    </p:extLst>
-  </p:cSld>
-  <p:clrMapOvr>
-    <a:masterClrMapping/>
-  </p:clrMapOvr>
-  <p:transition spd="slow">
-    <p:push dir="u"/>
-  </p:transition>
-  <p:timing>
-    <p:tnLst>
-      <p:par>
-        <p:cTn id="1" dur="indefinite" restart="never" nodeType="tmRoot"/>
-      </p:par>
-    </p:tnLst>
-  </p:timing>
-</p:sld>
-</file>
-
-<file path=ppt/slides/slide7.xml><?xml version="1.0" encoding="utf-8"?>
-<p:sld xmlns:a="http://schemas.openxmlformats.org/drawingml/2006/main" xmlns:r="http://schemas.openxmlformats.org/officeDocument/2006/relationships" xmlns:p="http://schemas.openxmlformats.org/presentationml/2006/main">
-  <p:cSld>
-    <p:spTree>
-      <p:nvGrpSpPr>
-        <p:cNvPr id="1" name=""/>
-        <p:cNvGrpSpPr/>
-        <p:nvPr/>
-      </p:nvGrpSpPr>
-      <p:grpSpPr>
-        <a:xfrm>
-          <a:off x="0" y="0"/>
-          <a:ext cx="0" cy="0"/>
-          <a:chOff x="0" y="0"/>
-          <a:chExt cx="0" cy="0"/>
-        </a:xfrm>
-      </p:grpSpPr>
-      <p:sp>
-        <p:nvSpPr>
-          <p:cNvPr id="6" name="Title 5"/>
-          <p:cNvSpPr>
-            <a:spLocks noGrp="1"/>
-          </p:cNvSpPr>
-          <p:nvPr>
-            <p:ph type="ctrTitle"/>
-          </p:nvPr>
-        </p:nvSpPr>
-        <p:spPr/>
-        <p:txBody>
-          <a:bodyPr/>
-          <a:lstStyle/>
-          <a:p>
-            <a:r>
-              <a:rPr lang="en-US" dirty="0" smtClean="0"/>
-              <a:t>Let’s Go to the Code!</a:t>
-            </a:r>
-            <a:endParaRPr lang="en-US" dirty="0"/>
-          </a:p>
-        </p:txBody>
-      </p:sp>
-      <p:sp>
-        <p:nvSpPr>
-          <p:cNvPr id="7" name="Subtitle 6"/>
-          <p:cNvSpPr>
-            <a:spLocks noGrp="1"/>
-          </p:cNvSpPr>
-          <p:nvPr>
-            <p:ph type="subTitle" idx="1"/>
-          </p:nvPr>
-        </p:nvSpPr>
-        <p:spPr/>
-        <p:txBody>
-          <a:bodyPr/>
-          <a:lstStyle/>
-          <a:p>
-            <a:endParaRPr lang="en-US"/>
-          </a:p>
-        </p:txBody>
-      </p:sp>
-    </p:spTree>
-    <p:extLst>
-      <p:ext uri="{BB962C8B-B14F-4D97-AF65-F5344CB8AC3E}">
-        <p14:creationId xmlns:p14="http://schemas.microsoft.com/office/powerpoint/2010/main" val="4112694553"/>
-      </p:ext>
-    </p:extLst>
-  </p:cSld>
-  <p:clrMapOvr>
-    <a:masterClrMapping/>
-  </p:clrMapOvr>
-  <p:transition spd="slow">
-    <p:push dir="u"/>
-  </p:transition>
-  <p:timing>
-    <p:tnLst>
-      <p:par>
-        <p:cTn id="1" dur="indefinite" restart="never" nodeType="tmRoot"/>
-      </p:par>
-    </p:tnLst>
-  </p:timing>
-</p:sld>
-</file>
-
-<file path=ppt/slides/slide8.xml><?xml version="1.0" encoding="utf-8"?>
-<p:sld xmlns:a="http://schemas.openxmlformats.org/drawingml/2006/main" xmlns:r="http://schemas.openxmlformats.org/officeDocument/2006/relationships" xmlns:p="http://schemas.openxmlformats.org/presentationml/2006/main">
-  <p:cSld>
-    <p:spTree>
-      <p:nvGrpSpPr>
-        <p:cNvPr id="1" name=""/>
-        <p:cNvGrpSpPr/>
-        <p:nvPr/>
-      </p:nvGrpSpPr>
-      <p:grpSpPr>
-        <a:xfrm>
-          <a:off x="0" y="0"/>
-          <a:ext cx="0" cy="0"/>
-          <a:chOff x="0" y="0"/>
-          <a:chExt cx="0" cy="0"/>
-        </a:xfrm>
-      </p:grpSpPr>
-      <p:sp>
-        <p:nvSpPr>
-          <p:cNvPr id="2" name="Title 1"/>
-          <p:cNvSpPr>
-            <a:spLocks noGrp="1"/>
-          </p:cNvSpPr>
-          <p:nvPr>
-            <p:ph type="title"/>
-          </p:nvPr>
-        </p:nvSpPr>
-        <p:spPr/>
-        <p:txBody>
-          <a:bodyPr/>
-          <a:lstStyle/>
-          <a:p>
-            <a:r>
-              <a:rPr lang="en-US" dirty="0" smtClean="0"/>
-              <a:t>The Downsides</a:t>
-            </a:r>
-            <a:endParaRPr lang="en-US" dirty="0"/>
-          </a:p>
-        </p:txBody>
-      </p:sp>
-      <p:sp>
-        <p:nvSpPr>
-          <p:cNvPr id="3" name="Content Placeholder 2"/>
-          <p:cNvSpPr>
-            <a:spLocks noGrp="1"/>
-          </p:cNvSpPr>
-          <p:nvPr>
-            <p:ph idx="1"/>
-          </p:nvPr>
-        </p:nvSpPr>
-        <p:spPr/>
-        <p:txBody>
-          <a:bodyPr/>
-          <a:lstStyle/>
-          <a:p>
-            <a:r>
-              <a:rPr lang="en-US" dirty="0" smtClean="0"/>
-              <a:t>Cannot create UI </a:t>
-            </a:r>
-            <a:r>
-              <a:rPr lang="en-US" dirty="0" smtClean="0"/>
-              <a:t>Tests for JavaScript based Apps</a:t>
-            </a:r>
-            <a:endParaRPr lang="en-US" dirty="0" smtClean="0"/>
-          </a:p>
-          <a:p>
-            <a:r>
-              <a:rPr lang="en-US" dirty="0" smtClean="0"/>
-              <a:t>Cannot </a:t>
-            </a:r>
-            <a:r>
-              <a:rPr lang="en-US" dirty="0" smtClean="0"/>
-              <a:t>use mocking frameworks like MOQ</a:t>
-            </a:r>
-          </a:p>
-          <a:p>
-            <a:pPr lvl="1"/>
-            <a:r>
-              <a:rPr lang="en-US" dirty="0" smtClean="0"/>
-              <a:t>Can use Microsoft’s own Fakes framework</a:t>
-            </a:r>
-          </a:p>
-          <a:p>
-            <a:r>
-              <a:rPr lang="en-US" dirty="0" err="1" smtClean="0"/>
-              <a:t>NUnit</a:t>
-            </a:r>
-            <a:r>
-              <a:rPr lang="en-US" dirty="0" smtClean="0"/>
-              <a:t> is </a:t>
-            </a:r>
-            <a:r>
-              <a:rPr lang="en-US" dirty="0" smtClean="0"/>
-              <a:t>spotty</a:t>
-            </a:r>
-            <a:endParaRPr lang="en-US" dirty="0" smtClean="0"/>
-          </a:p>
-          <a:p>
-            <a:pPr lvl="1"/>
-            <a:r>
-              <a:rPr lang="en-US" dirty="0" err="1" smtClean="0"/>
-              <a:t>XUnit</a:t>
-            </a:r>
-            <a:r>
-              <a:rPr lang="en-US" dirty="0" smtClean="0"/>
-              <a:t> is supported through third-party project template available for down load</a:t>
-            </a:r>
-          </a:p>
-          <a:p>
-            <a:endParaRPr lang="en-US" dirty="0"/>
-          </a:p>
-        </p:txBody>
-      </p:sp>
-    </p:spTree>
-    <p:extLst>
-      <p:ext uri="{BB962C8B-B14F-4D97-AF65-F5344CB8AC3E}">
-        <p14:creationId xmlns:p14="http://schemas.microsoft.com/office/powerpoint/2010/main" val="3953608039"/>
-      </p:ext>
-    </p:extLst>
-  </p:cSld>
-  <p:clrMapOvr>
-    <a:masterClrMapping/>
-  </p:clrMapOvr>
-  <p:timing>
-    <p:tnLst>
-      <p:par>
-        <p:cTn id="1" dur="indefinite" restart="never" nodeType="tmRoot"/>
-      </p:par>
-    </p:tnLst>
-  </p:timing>
-</p:sld>
-</file>
-
-<file path=ppt/slides/slide9.xml><?xml version="1.0" encoding="utf-8"?>
-<p:sld xmlns:a="http://schemas.openxmlformats.org/drawingml/2006/main" xmlns:r="http://schemas.openxmlformats.org/officeDocument/2006/relationships" xmlns:p="http://schemas.openxmlformats.org/presentationml/2006/main">
-  <p:cSld>
-    <p:spTree>
-      <p:nvGrpSpPr>
-        <p:cNvPr id="1" name=""/>
-        <p:cNvGrpSpPr/>
-        <p:nvPr/>
-      </p:nvGrpSpPr>
-      <p:grpSpPr>
-        <a:xfrm>
-          <a:off x="0" y="0"/>
-          <a:ext cx="0" cy="0"/>
-          <a:chOff x="0" y="0"/>
-          <a:chExt cx="0" cy="0"/>
-        </a:xfrm>
-      </p:grpSpPr>
-      <p:sp>
-        <p:nvSpPr>
-          <p:cNvPr id="2" name="Title 1"/>
-          <p:cNvSpPr>
-            <a:spLocks noGrp="1"/>
-          </p:cNvSpPr>
-          <p:nvPr>
-            <p:ph type="title"/>
-          </p:nvPr>
-        </p:nvSpPr>
-        <p:spPr>
-          <a:xfrm>
-            <a:off x="982133" y="457201"/>
-            <a:ext cx="7704667" cy="1130826"/>
-          </a:xfrm>
-        </p:spPr>
-        <p:txBody>
-          <a:bodyPr>
-            <a:noAutofit/>
-          </a:bodyPr>
-          <a:lstStyle/>
-          <a:p>
-            <a:r>
-              <a:rPr lang="en-US" sz="3600" dirty="0" smtClean="0"/>
-              <a:t>Pro Agile .NET Development with Scrum</a:t>
-            </a:r>
-            <a:endParaRPr lang="en-US" sz="3600" dirty="0"/>
-          </a:p>
-        </p:txBody>
-      </p:sp>
-      <p:pic>
-        <p:nvPicPr>
-          <p:cNvPr id="4" name="Content Placeholder 3" descr="Screen Shot 2011-10-22 at 9.08.29 AM.png"/>
-          <p:cNvPicPr>
-            <a:picLocks noGrp="1" noChangeAspect="1"/>
-          </p:cNvPicPr>
-          <p:nvPr>
-            <p:ph idx="1"/>
-          </p:nvPr>
-        </p:nvPicPr>
-        <p:blipFill>
-          <a:blip r:embed="rId3">
-            <a:extLst>
-              <a:ext uri="{28A0092B-C50C-407E-A947-70E740481C1C}">
-                <a14:useLocalDpi xmlns:a14="http://schemas.microsoft.com/office/drawing/2010/main" val="0"/>
-              </a:ext>
-            </a:extLst>
-          </a:blip>
-          <a:srcRect l="-88527" r="-88527"/>
-          <a:stretch>
-            <a:fillRect/>
-          </a:stretch>
-        </p:blipFill>
-        <p:spPr>
-          <a:xfrm>
-            <a:off x="-304800" y="1676400"/>
-            <a:ext cx="9677400" cy="4343400"/>
-          </a:xfrm>
-        </p:spPr>
-      </p:pic>
-      <p:sp>
-        <p:nvSpPr>
-          <p:cNvPr id="3" name="Footer Placeholder 2"/>
-          <p:cNvSpPr>
-            <a:spLocks noGrp="1"/>
-          </p:cNvSpPr>
-          <p:nvPr>
-            <p:ph type="ftr" sz="quarter" idx="11"/>
-          </p:nvPr>
-        </p:nvSpPr>
-        <p:spPr>
-          <a:xfrm>
-            <a:off x="3200400" y="6108173"/>
-            <a:ext cx="2971800" cy="365125"/>
-          </a:xfrm>
-        </p:spPr>
-        <p:txBody>
-          <a:bodyPr/>
-          <a:lstStyle/>
-          <a:p>
-            <a:r>
-              <a:rPr lang="en-US" sz="2000" dirty="0">
-                <a:solidFill>
-                  <a:srgbClr val="0070C0"/>
-                </a:solidFill>
-              </a:rPr>
-              <a:t>http://amzn.to/1aMYF24</a:t>
-            </a:r>
-          </a:p>
-        </p:txBody>
-      </p:sp>
-    </p:spTree>
-    <p:extLst>
-      <p:ext uri="{BB962C8B-B14F-4D97-AF65-F5344CB8AC3E}">
-        <p14:creationId xmlns:p14="http://schemas.microsoft.com/office/powerpoint/2010/main" val="2348140690"/>
       </p:ext>
     </p:extLst>
   </p:cSld>

</xml_diff>